<commit_message>
Added resources slide at the end
</commit_message>
<xml_diff>
--- a/Boosting Your Resume with GitHub.pptx
+++ b/Boosting Your Resume with GitHub.pptx
@@ -20,6 +20,7 @@
     <p:sldId id="268" r:id="rId14"/>
     <p:sldId id="269" r:id="rId15"/>
     <p:sldId id="267" r:id="rId16"/>
+    <p:sldId id="276" r:id="rId17"/>
   </p:sldIdLst>
   <p:sldSz cx="12192000" cy="6858000"/>
   <p:notesSz cx="6858000" cy="9144000"/>
@@ -129,7 +130,7 @@
 <file path=ppt/revisionInfo.xml><?xml version="1.0" encoding="utf-8"?>
 <p1510:revInfo xmlns:a="http://schemas.openxmlformats.org/drawingml/2006/main" xmlns:r="http://schemas.openxmlformats.org/officeDocument/2006/relationships" xmlns:p1510="http://schemas.microsoft.com/office/powerpoint/2015/10/main">
   <p1510:revLst>
-    <p1510:client id="{87D7C839-E1DB-4984-9884-DAFCEE36B2C9}" v="61" dt="2024-09-15T19:11:18.014"/>
+    <p1510:client id="{87D7C839-E1DB-4984-9884-DAFCEE36B2C9}" v="71" dt="2024-09-15T20:29:19.815"/>
   </p1510:revLst>
 </p1510:revInfo>
 </file>
@@ -139,7 +140,7 @@
   <pc:docChgLst>
     <pc:chgData name="Gsell, Steven D." userId="6e84bc59-7e38-490f-9209-f43946aa50d2" providerId="ADAL" clId="{87D7C839-E1DB-4984-9884-DAFCEE36B2C9}"/>
     <pc:docChg chg="undo custSel addSld delSld modSld sldOrd">
-      <pc:chgData name="Gsell, Steven D." userId="6e84bc59-7e38-490f-9209-f43946aa50d2" providerId="ADAL" clId="{87D7C839-E1DB-4984-9884-DAFCEE36B2C9}" dt="2024-09-15T19:11:25.377" v="8169" actId="1076"/>
+      <pc:chgData name="Gsell, Steven D." userId="6e84bc59-7e38-490f-9209-f43946aa50d2" providerId="ADAL" clId="{87D7C839-E1DB-4984-9884-DAFCEE36B2C9}" dt="2024-09-15T20:30:20.001" v="8544" actId="732"/>
       <pc:docMkLst>
         <pc:docMk/>
       </pc:docMkLst>
@@ -803,7 +804,7 @@
         </pc:cxnChg>
       </pc:sldChg>
       <pc:sldChg chg="addSp delSp modSp add mod">
-        <pc:chgData name="Gsell, Steven D." userId="6e84bc59-7e38-490f-9209-f43946aa50d2" providerId="ADAL" clId="{87D7C839-E1DB-4984-9884-DAFCEE36B2C9}" dt="2024-09-15T19:09:18.354" v="8166" actId="14861"/>
+        <pc:chgData name="Gsell, Steven D." userId="6e84bc59-7e38-490f-9209-f43946aa50d2" providerId="ADAL" clId="{87D7C839-E1DB-4984-9884-DAFCEE36B2C9}" dt="2024-09-15T20:30:20.001" v="8544" actId="732"/>
         <pc:sldMkLst>
           <pc:docMk/>
           <pc:sldMk cId="2635435395" sldId="269"/>
@@ -832,8 +833,8 @@
             <ac:picMk id="5" creationId="{C64D0100-B1B7-868C-382A-9920FD8DEF02}"/>
           </ac:picMkLst>
         </pc:picChg>
-        <pc:picChg chg="add del mod">
-          <ac:chgData name="Gsell, Steven D." userId="6e84bc59-7e38-490f-9209-f43946aa50d2" providerId="ADAL" clId="{87D7C839-E1DB-4984-9884-DAFCEE36B2C9}" dt="2024-09-15T19:09:18.354" v="8166" actId="14861"/>
+        <pc:picChg chg="add del mod modCrop">
+          <ac:chgData name="Gsell, Steven D." userId="6e84bc59-7e38-490f-9209-f43946aa50d2" providerId="ADAL" clId="{87D7C839-E1DB-4984-9884-DAFCEE36B2C9}" dt="2024-09-15T20:30:20.001" v="8544" actId="732"/>
           <ac:picMkLst>
             <pc:docMk/>
             <pc:sldMk cId="2635435395" sldId="269"/>
@@ -1118,7 +1119,7 @@
         </pc:picChg>
       </pc:sldChg>
       <pc:sldChg chg="modSp add mod">
-        <pc:chgData name="Gsell, Steven D." userId="6e84bc59-7e38-490f-9209-f43946aa50d2" providerId="ADAL" clId="{87D7C839-E1DB-4984-9884-DAFCEE36B2C9}" dt="2024-09-13T21:45:34.703" v="7077" actId="20577"/>
+        <pc:chgData name="Gsell, Steven D." userId="6e84bc59-7e38-490f-9209-f43946aa50d2" providerId="ADAL" clId="{87D7C839-E1DB-4984-9884-DAFCEE36B2C9}" dt="2024-09-15T20:21:17.469" v="8276" actId="20577"/>
         <pc:sldMkLst>
           <pc:docMk/>
           <pc:sldMk cId="2469890694" sldId="274"/>
@@ -1132,7 +1133,7 @@
           </ac:spMkLst>
         </pc:spChg>
         <pc:spChg chg="mod">
-          <ac:chgData name="Gsell, Steven D." userId="6e84bc59-7e38-490f-9209-f43946aa50d2" providerId="ADAL" clId="{87D7C839-E1DB-4984-9884-DAFCEE36B2C9}" dt="2024-09-13T21:38:12.850" v="6856" actId="313"/>
+          <ac:chgData name="Gsell, Steven D." userId="6e84bc59-7e38-490f-9209-f43946aa50d2" providerId="ADAL" clId="{87D7C839-E1DB-4984-9884-DAFCEE36B2C9}" dt="2024-09-15T20:21:17.469" v="8276" actId="20577"/>
           <ac:spMkLst>
             <pc:docMk/>
             <pc:sldMk cId="2469890694" sldId="274"/>
@@ -1226,6 +1227,53 @@
             <ac:cxnSpMk id="13" creationId="{245E6A42-84F4-CD06-B123-C28EAEEFC5B3}"/>
           </ac:cxnSpMkLst>
         </pc:cxnChg>
+      </pc:sldChg>
+      <pc:sldChg chg="delSp modSp add mod">
+        <pc:chgData name="Gsell, Steven D." userId="6e84bc59-7e38-490f-9209-f43946aa50d2" providerId="ADAL" clId="{87D7C839-E1DB-4984-9884-DAFCEE36B2C9}" dt="2024-09-15T20:26:03.116" v="8535" actId="20577"/>
+        <pc:sldMkLst>
+          <pc:docMk/>
+          <pc:sldMk cId="2876943490" sldId="276"/>
+        </pc:sldMkLst>
+        <pc:spChg chg="mod">
+          <ac:chgData name="Gsell, Steven D." userId="6e84bc59-7e38-490f-9209-f43946aa50d2" providerId="ADAL" clId="{87D7C839-E1DB-4984-9884-DAFCEE36B2C9}" dt="2024-09-15T19:46:44.430" v="8179" actId="20577"/>
+          <ac:spMkLst>
+            <pc:docMk/>
+            <pc:sldMk cId="2876943490" sldId="276"/>
+            <ac:spMk id="7" creationId="{884E008F-D37C-05E3-B464-8FE7CAD33DC1}"/>
+          </ac:spMkLst>
+        </pc:spChg>
+        <pc:spChg chg="mod">
+          <ac:chgData name="Gsell, Steven D." userId="6e84bc59-7e38-490f-9209-f43946aa50d2" providerId="ADAL" clId="{87D7C839-E1DB-4984-9884-DAFCEE36B2C9}" dt="2024-09-15T20:26:03.116" v="8535" actId="20577"/>
+          <ac:spMkLst>
+            <pc:docMk/>
+            <pc:sldMk cId="2876943490" sldId="276"/>
+            <ac:spMk id="8" creationId="{3864AF18-5C68-562E-2B23-B2944DA8E681}"/>
+          </ac:spMkLst>
+        </pc:spChg>
+        <pc:picChg chg="del">
+          <ac:chgData name="Gsell, Steven D." userId="6e84bc59-7e38-490f-9209-f43946aa50d2" providerId="ADAL" clId="{87D7C839-E1DB-4984-9884-DAFCEE36B2C9}" dt="2024-09-15T19:46:50.298" v="8183" actId="478"/>
+          <ac:picMkLst>
+            <pc:docMk/>
+            <pc:sldMk cId="2876943490" sldId="276"/>
+            <ac:picMk id="5" creationId="{B8D19137-17EA-8936-2491-7A838A74E131}"/>
+          </ac:picMkLst>
+        </pc:picChg>
+        <pc:picChg chg="del mod">
+          <ac:chgData name="Gsell, Steven D." userId="6e84bc59-7e38-490f-9209-f43946aa50d2" providerId="ADAL" clId="{87D7C839-E1DB-4984-9884-DAFCEE36B2C9}" dt="2024-09-15T19:46:49.794" v="8182" actId="478"/>
+          <ac:picMkLst>
+            <pc:docMk/>
+            <pc:sldMk cId="2876943490" sldId="276"/>
+            <ac:picMk id="6" creationId="{68742E1E-E599-E143-25B9-7A330BAB3439}"/>
+          </ac:picMkLst>
+        </pc:picChg>
+        <pc:picChg chg="del">
+          <ac:chgData name="Gsell, Steven D." userId="6e84bc59-7e38-490f-9209-f43946aa50d2" providerId="ADAL" clId="{87D7C839-E1DB-4984-9884-DAFCEE36B2C9}" dt="2024-09-15T19:46:49.311" v="8180" actId="478"/>
+          <ac:picMkLst>
+            <pc:docMk/>
+            <pc:sldMk cId="2876943490" sldId="276"/>
+            <ac:picMk id="10" creationId="{1999192E-5F5F-4BB7-D567-F4A3CEEFE9C6}"/>
+          </ac:picMkLst>
+        </pc:picChg>
       </pc:sldChg>
     </pc:docChg>
   </pc:docChgLst>
@@ -6851,7 +6899,7 @@
         <p:spPr>
           <a:xfrm>
             <a:off x="1846744" y="1756042"/>
-            <a:ext cx="8498512" cy="2954078"/>
+            <a:ext cx="8498512" cy="2538580"/>
           </a:xfrm>
           <a:prstGeom prst="rect">
             <a:avLst/>
@@ -6915,20 +6963,7 @@
             </a:pPr>
             <a:r>
               <a:rPr lang="en-US" b="1" dirty="0"/>
-              <a:t>git add index.html</a:t>
-            </a:r>
-          </a:p>
-          <a:p>
-            <a:pPr marL="1200150" lvl="2" indent="-285750">
-              <a:lnSpc>
-                <a:spcPct val="150000"/>
-              </a:lnSpc>
-              <a:buFont typeface="Wingdings" panose="05000000000000000000" pitchFamily="2" charset="2"/>
-              <a:buChar char="§"/>
-            </a:pPr>
-            <a:r>
-              <a:rPr lang="en-US" dirty="0"/>
-              <a:t>in the future “index.html” can be replaced by any file you change</a:t>
+              <a:t>git add *</a:t>
             </a:r>
           </a:p>
           <a:p>
@@ -7725,13 +7760,13 @@
               </a:ext>
             </a:extLst>
           </a:blip>
-          <a:srcRect/>
+          <a:srcRect r="2693" b="3215"/>
           <a:stretch/>
         </p:blipFill>
         <p:spPr>
           <a:xfrm>
-            <a:off x="8313217" y="2500225"/>
-            <a:ext cx="3382971" cy="4076327"/>
+            <a:off x="8313217" y="2507129"/>
+            <a:ext cx="3291840" cy="3931920"/>
           </a:xfrm>
           <a:prstGeom prst="rect">
             <a:avLst/>
@@ -8148,6 +8183,419 @@
     <p:extLst>
       <p:ext uri="{BB962C8B-B14F-4D97-AF65-F5344CB8AC3E}">
         <p14:creationId xmlns:p14="http://schemas.microsoft.com/office/powerpoint/2010/main" val="1717234827"/>
+      </p:ext>
+    </p:extLst>
+  </p:cSld>
+  <p:clrMapOvr>
+    <a:masterClrMapping/>
+  </p:clrMapOvr>
+</p:sld>
+</file>
+
+<file path=ppt/slides/slide16.xml><?xml version="1.0" encoding="utf-8"?>
+<p:sld xmlns:a="http://schemas.openxmlformats.org/drawingml/2006/main" xmlns:r="http://schemas.openxmlformats.org/officeDocument/2006/relationships" xmlns:p="http://schemas.openxmlformats.org/presentationml/2006/main">
+  <p:cSld>
+    <p:spTree>
+      <p:nvGrpSpPr>
+        <p:cNvPr id="1" name=""/>
+        <p:cNvGrpSpPr/>
+        <p:nvPr/>
+      </p:nvGrpSpPr>
+      <p:grpSpPr>
+        <a:xfrm>
+          <a:off x="0" y="0"/>
+          <a:ext cx="0" cy="0"/>
+          <a:chOff x="0" y="0"/>
+          <a:chExt cx="0" cy="0"/>
+        </a:xfrm>
+      </p:grpSpPr>
+      <p:sp>
+        <p:nvSpPr>
+          <p:cNvPr id="4" name="Rectangle 3">
+            <a:extLst>
+              <a:ext uri="{FF2B5EF4-FFF2-40B4-BE49-F238E27FC236}">
+                <a16:creationId xmlns:a16="http://schemas.microsoft.com/office/drawing/2014/main" id="{DB4281AA-335B-3B26-6953-A1FD6E956CB2}"/>
+              </a:ext>
+            </a:extLst>
+          </p:cNvPr>
+          <p:cNvSpPr>
+            <a:spLocks noGrp="1" noRot="1" noMove="1" noResize="1" noEditPoints="1" noAdjustHandles="1" noChangeArrowheads="1" noChangeShapeType="1"/>
+          </p:cNvSpPr>
+          <p:nvPr/>
+        </p:nvSpPr>
+        <p:spPr>
+          <a:xfrm>
+            <a:off x="0" y="0"/>
+            <a:ext cx="12192000" cy="6858000"/>
+          </a:xfrm>
+          <a:prstGeom prst="rect">
+            <a:avLst/>
+          </a:prstGeom>
+          <a:solidFill>
+            <a:schemeClr val="bg2"/>
+          </a:solidFill>
+        </p:spPr>
+        <p:style>
+          <a:lnRef idx="2">
+            <a:schemeClr val="accent1">
+              <a:shade val="15000"/>
+            </a:schemeClr>
+          </a:lnRef>
+          <a:fillRef idx="1">
+            <a:schemeClr val="accent1"/>
+          </a:fillRef>
+          <a:effectRef idx="0">
+            <a:schemeClr val="accent1"/>
+          </a:effectRef>
+          <a:fontRef idx="minor">
+            <a:schemeClr val="lt1"/>
+          </a:fontRef>
+        </p:style>
+        <p:txBody>
+          <a:bodyPr rtlCol="0" anchor="ctr"/>
+          <a:lstStyle/>
+          <a:p>
+            <a:pPr algn="ctr"/>
+            <a:endParaRPr lang="en-US"/>
+          </a:p>
+        </p:txBody>
+      </p:sp>
+      <p:sp>
+        <p:nvSpPr>
+          <p:cNvPr id="2" name="Rectangle 1">
+            <a:extLst>
+              <a:ext uri="{FF2B5EF4-FFF2-40B4-BE49-F238E27FC236}">
+                <a16:creationId xmlns:a16="http://schemas.microsoft.com/office/drawing/2014/main" id="{829FF999-D711-DA7F-C720-162D38E0EEBD}"/>
+              </a:ext>
+            </a:extLst>
+          </p:cNvPr>
+          <p:cNvSpPr/>
+          <p:nvPr/>
+        </p:nvSpPr>
+        <p:spPr>
+          <a:xfrm>
+            <a:off x="0" y="0"/>
+            <a:ext cx="12192000" cy="1504335"/>
+          </a:xfrm>
+          <a:prstGeom prst="rect">
+            <a:avLst/>
+          </a:prstGeom>
+          <a:solidFill>
+            <a:srgbClr val="20495E"/>
+          </a:solidFill>
+        </p:spPr>
+        <p:style>
+          <a:lnRef idx="2">
+            <a:schemeClr val="accent1">
+              <a:shade val="15000"/>
+            </a:schemeClr>
+          </a:lnRef>
+          <a:fillRef idx="1">
+            <a:schemeClr val="accent1"/>
+          </a:fillRef>
+          <a:effectRef idx="0">
+            <a:schemeClr val="accent1"/>
+          </a:effectRef>
+          <a:fontRef idx="minor">
+            <a:schemeClr val="lt1"/>
+          </a:fontRef>
+        </p:style>
+        <p:txBody>
+          <a:bodyPr rtlCol="0" anchor="ctr"/>
+          <a:lstStyle/>
+          <a:p>
+            <a:pPr algn="ctr"/>
+            <a:endParaRPr lang="en-US"/>
+          </a:p>
+        </p:txBody>
+      </p:sp>
+      <p:sp>
+        <p:nvSpPr>
+          <p:cNvPr id="7" name="Title 1">
+            <a:extLst>
+              <a:ext uri="{FF2B5EF4-FFF2-40B4-BE49-F238E27FC236}">
+                <a16:creationId xmlns:a16="http://schemas.microsoft.com/office/drawing/2014/main" id="{884E008F-D37C-05E3-B464-8FE7CAD33DC1}"/>
+              </a:ext>
+            </a:extLst>
+          </p:cNvPr>
+          <p:cNvSpPr txBox="1">
+            <a:spLocks/>
+          </p:cNvSpPr>
+          <p:nvPr/>
+        </p:nvSpPr>
+        <p:spPr>
+          <a:xfrm>
+            <a:off x="1569720" y="281448"/>
+            <a:ext cx="9052560" cy="941438"/>
+          </a:xfrm>
+          <a:prstGeom prst="rect">
+            <a:avLst/>
+          </a:prstGeom>
+        </p:spPr>
+        <p:txBody>
+          <a:bodyPr>
+            <a:normAutofit/>
+          </a:bodyPr>
+          <a:lstStyle>
+            <a:lvl1pPr algn="l" defTabSz="914400" rtl="0" eaLnBrk="1" latinLnBrk="0" hangingPunct="1">
+              <a:lnSpc>
+                <a:spcPct val="90000"/>
+              </a:lnSpc>
+              <a:spcBef>
+                <a:spcPct val="0"/>
+              </a:spcBef>
+              <a:buNone/>
+              <a:defRPr sz="6000" i="1" kern="1200" spc="100" baseline="0">
+                <a:solidFill>
+                  <a:schemeClr val="tx1">
+                    <a:lumMod val="85000"/>
+                    <a:lumOff val="15000"/>
+                  </a:schemeClr>
+                </a:solidFill>
+                <a:latin typeface="+mj-lt"/>
+                <a:ea typeface="+mj-ea"/>
+                <a:cs typeface="+mj-cs"/>
+              </a:defRPr>
+            </a:lvl1pPr>
+          </a:lstStyle>
+          <a:p>
+            <a:pPr algn="ctr"/>
+            <a:r>
+              <a:rPr lang="en-US" dirty="0">
+                <a:solidFill>
+                  <a:schemeClr val="bg1"/>
+                </a:solidFill>
+              </a:rPr>
+              <a:t>Resources</a:t>
+            </a:r>
+            <a:endParaRPr lang="en-US" sz="2000" dirty="0">
+              <a:solidFill>
+                <a:schemeClr val="bg1"/>
+              </a:solidFill>
+            </a:endParaRPr>
+          </a:p>
+        </p:txBody>
+      </p:sp>
+      <p:sp>
+        <p:nvSpPr>
+          <p:cNvPr id="8" name="TextBox 7">
+            <a:extLst>
+              <a:ext uri="{FF2B5EF4-FFF2-40B4-BE49-F238E27FC236}">
+                <a16:creationId xmlns:a16="http://schemas.microsoft.com/office/drawing/2014/main" id="{3864AF18-5C68-562E-2B23-B2944DA8E681}"/>
+              </a:ext>
+            </a:extLst>
+          </p:cNvPr>
+          <p:cNvSpPr txBox="1"/>
+          <p:nvPr/>
+        </p:nvSpPr>
+        <p:spPr>
+          <a:xfrm>
+            <a:off x="1846744" y="1756042"/>
+            <a:ext cx="8498512" cy="4200574"/>
+          </a:xfrm>
+          <a:prstGeom prst="rect">
+            <a:avLst/>
+          </a:prstGeom>
+          <a:noFill/>
+        </p:spPr>
+        <p:txBody>
+          <a:bodyPr wrap="square" rtlCol="0">
+            <a:spAutoFit/>
+          </a:bodyPr>
+          <a:lstStyle/>
+          <a:p>
+            <a:pPr marL="285750" indent="-285750">
+              <a:lnSpc>
+                <a:spcPct val="150000"/>
+              </a:lnSpc>
+              <a:buFont typeface="Arial" panose="020B0604020202020204" pitchFamily="34" charset="0"/>
+              <a:buChar char="•"/>
+            </a:pPr>
+            <a:r>
+              <a:rPr lang="en-US" dirty="0" err="1">
+                <a:hlinkClick r:id="rId2"/>
+              </a:rPr>
+              <a:t>VSCode</a:t>
+            </a:r>
+            <a:r>
+              <a:rPr lang="en-US" dirty="0"/>
+              <a:t> – Text editor</a:t>
+            </a:r>
+          </a:p>
+          <a:p>
+            <a:pPr marL="285750" indent="-285750">
+              <a:lnSpc>
+                <a:spcPct val="150000"/>
+              </a:lnSpc>
+              <a:buFont typeface="Arial" panose="020B0604020202020204" pitchFamily="34" charset="0"/>
+              <a:buChar char="•"/>
+            </a:pPr>
+            <a:r>
+              <a:rPr lang="en-US" dirty="0">
+                <a:hlinkClick r:id="rId3"/>
+              </a:rPr>
+              <a:t>Git</a:t>
+            </a:r>
+            <a:r>
+              <a:rPr lang="en-US" dirty="0"/>
+              <a:t> – Command Line tool</a:t>
+            </a:r>
+          </a:p>
+          <a:p>
+            <a:pPr marL="285750" indent="-285750">
+              <a:lnSpc>
+                <a:spcPct val="150000"/>
+              </a:lnSpc>
+              <a:buFont typeface="Arial" panose="020B0604020202020204" pitchFamily="34" charset="0"/>
+              <a:buChar char="•"/>
+            </a:pPr>
+            <a:r>
+              <a:rPr lang="en-US" dirty="0">
+                <a:hlinkClick r:id="rId4"/>
+              </a:rPr>
+              <a:t>Figma</a:t>
+            </a:r>
+            <a:r>
+              <a:rPr lang="en-US" dirty="0"/>
+              <a:t> – UX/UI design tool</a:t>
+            </a:r>
+          </a:p>
+          <a:p>
+            <a:pPr marL="285750" indent="-285750">
+              <a:lnSpc>
+                <a:spcPct val="150000"/>
+              </a:lnSpc>
+              <a:buFont typeface="Arial" panose="020B0604020202020204" pitchFamily="34" charset="0"/>
+              <a:buChar char="•"/>
+            </a:pPr>
+            <a:endParaRPr lang="en-US" dirty="0"/>
+          </a:p>
+          <a:p>
+            <a:pPr marL="285750" indent="-285750">
+              <a:lnSpc>
+                <a:spcPct val="150000"/>
+              </a:lnSpc>
+              <a:buFont typeface="Arial" panose="020B0604020202020204" pitchFamily="34" charset="0"/>
+              <a:buChar char="•"/>
+            </a:pPr>
+            <a:r>
+              <a:rPr lang="en-US" dirty="0" err="1">
+                <a:hlinkClick r:id="rId5"/>
+              </a:rPr>
+              <a:t>QRCode</a:t>
+            </a:r>
+            <a:r>
+              <a:rPr lang="en-US" dirty="0">
+                <a:hlinkClick r:id="rId5"/>
+              </a:rPr>
+              <a:t> Monkey </a:t>
+            </a:r>
+            <a:r>
+              <a:rPr lang="en-US" dirty="0"/>
+              <a:t>– QR Code generator</a:t>
+            </a:r>
+          </a:p>
+          <a:p>
+            <a:pPr marL="285750" indent="-285750">
+              <a:lnSpc>
+                <a:spcPct val="150000"/>
+              </a:lnSpc>
+              <a:buFont typeface="Arial" panose="020B0604020202020204" pitchFamily="34" charset="0"/>
+              <a:buChar char="•"/>
+            </a:pPr>
+            <a:r>
+              <a:rPr lang="en-US" dirty="0" err="1">
+                <a:hlinkClick r:id="rId6"/>
+              </a:rPr>
+              <a:t>Pexels</a:t>
+            </a:r>
+            <a:r>
+              <a:rPr lang="en-US" dirty="0"/>
+              <a:t> – Royalty Free Images</a:t>
+            </a:r>
+          </a:p>
+          <a:p>
+            <a:pPr marL="285750" indent="-285750">
+              <a:lnSpc>
+                <a:spcPct val="150000"/>
+              </a:lnSpc>
+              <a:buFont typeface="Arial" panose="020B0604020202020204" pitchFamily="34" charset="0"/>
+              <a:buChar char="•"/>
+            </a:pPr>
+            <a:r>
+              <a:rPr lang="en-US" dirty="0" err="1">
+                <a:hlinkClick r:id="rId7"/>
+              </a:rPr>
+              <a:t>IconMonstr</a:t>
+            </a:r>
+            <a:r>
+              <a:rPr lang="en-US" dirty="0"/>
+              <a:t> – Free icons</a:t>
+            </a:r>
+          </a:p>
+          <a:p>
+            <a:pPr marL="285750" indent="-285750">
+              <a:lnSpc>
+                <a:spcPct val="150000"/>
+              </a:lnSpc>
+              <a:buFont typeface="Arial" panose="020B0604020202020204" pitchFamily="34" charset="0"/>
+              <a:buChar char="•"/>
+            </a:pPr>
+            <a:r>
+              <a:rPr lang="en-US" dirty="0" err="1">
+                <a:hlinkClick r:id="rId8"/>
+              </a:rPr>
+              <a:t>ColorHunt</a:t>
+            </a:r>
+            <a:r>
+              <a:rPr lang="en-US" dirty="0"/>
+              <a:t>  - Cohesive color palettes </a:t>
+            </a:r>
+          </a:p>
+          <a:p>
+            <a:pPr marL="285750" indent="-285750">
+              <a:lnSpc>
+                <a:spcPct val="150000"/>
+              </a:lnSpc>
+              <a:buFont typeface="Arial" panose="020B0604020202020204" pitchFamily="34" charset="0"/>
+              <a:buChar char="•"/>
+            </a:pPr>
+            <a:r>
+              <a:rPr lang="en-US" dirty="0" err="1">
+                <a:hlinkClick r:id="rId9"/>
+              </a:rPr>
+              <a:t>Codecademy</a:t>
+            </a:r>
+            <a:r>
+              <a:rPr lang="en-US" dirty="0"/>
+              <a:t> – Learn HTML/CSS for web page design</a:t>
+            </a:r>
+          </a:p>
+          <a:p>
+            <a:pPr marL="285750" indent="-285750">
+              <a:lnSpc>
+                <a:spcPct val="150000"/>
+              </a:lnSpc>
+              <a:buFont typeface="Arial" panose="020B0604020202020204" pitchFamily="34" charset="0"/>
+              <a:buChar char="•"/>
+            </a:pPr>
+            <a:r>
+              <a:rPr lang="en-US" dirty="0">
+                <a:hlinkClick r:id="rId10"/>
+              </a:rPr>
+              <a:t>GitHub Education </a:t>
+            </a:r>
+            <a:r>
+              <a:rPr lang="en-US" dirty="0"/>
+              <a:t>– Free Student resources (TAKE ADVANTAGE OF THIS!!!)</a:t>
+            </a:r>
+          </a:p>
+        </p:txBody>
+      </p:sp>
+    </p:spTree>
+    <p:extLst>
+      <p:ext uri="{BB962C8B-B14F-4D97-AF65-F5344CB8AC3E}">
+        <p14:creationId xmlns:p14="http://schemas.microsoft.com/office/powerpoint/2010/main" val="2876943490"/>
       </p:ext>
     </p:extLst>
   </p:cSld>

</xml_diff>

<commit_message>
Added background image change slide at the end
</commit_message>
<xml_diff>
--- a/Boosting Your Resume with GitHub.pptx
+++ b/Boosting Your Resume with GitHub.pptx
@@ -21,6 +21,7 @@
     <p:sldId id="269" r:id="rId15"/>
     <p:sldId id="267" r:id="rId16"/>
     <p:sldId id="276" r:id="rId17"/>
+    <p:sldId id="277" r:id="rId18"/>
   </p:sldIdLst>
   <p:sldSz cx="12192000" cy="6858000"/>
   <p:notesSz cx="6858000" cy="9144000"/>
@@ -130,7 +131,7 @@
 <file path=ppt/revisionInfo.xml><?xml version="1.0" encoding="utf-8"?>
 <p1510:revInfo xmlns:a="http://schemas.openxmlformats.org/drawingml/2006/main" xmlns:r="http://schemas.openxmlformats.org/officeDocument/2006/relationships" xmlns:p1510="http://schemas.microsoft.com/office/powerpoint/2015/10/main">
   <p1510:revLst>
-    <p1510:client id="{87D7C839-E1DB-4984-9884-DAFCEE36B2C9}" v="71" dt="2024-09-15T20:29:19.815"/>
+    <p1510:client id="{87D7C839-E1DB-4984-9884-DAFCEE36B2C9}" v="72" dt="2024-09-16T23:02:11.416"/>
   </p1510:revLst>
 </p1510:revInfo>
 </file>
@@ -140,7 +141,7 @@
   <pc:docChgLst>
     <pc:chgData name="Gsell, Steven D." userId="6e84bc59-7e38-490f-9209-f43946aa50d2" providerId="ADAL" clId="{87D7C839-E1DB-4984-9884-DAFCEE36B2C9}"/>
     <pc:docChg chg="undo custSel addSld delSld modSld sldOrd">
-      <pc:chgData name="Gsell, Steven D." userId="6e84bc59-7e38-490f-9209-f43946aa50d2" providerId="ADAL" clId="{87D7C839-E1DB-4984-9884-DAFCEE36B2C9}" dt="2024-09-15T20:30:20.001" v="8544" actId="732"/>
+      <pc:chgData name="Gsell, Steven D." userId="6e84bc59-7e38-490f-9209-f43946aa50d2" providerId="ADAL" clId="{87D7C839-E1DB-4984-9884-DAFCEE36B2C9}" dt="2024-09-16T23:02:23.054" v="9057" actId="1076"/>
       <pc:docMkLst>
         <pc:docMk/>
       </pc:docMkLst>
@@ -1119,7 +1120,7 @@
         </pc:picChg>
       </pc:sldChg>
       <pc:sldChg chg="modSp add mod">
-        <pc:chgData name="Gsell, Steven D." userId="6e84bc59-7e38-490f-9209-f43946aa50d2" providerId="ADAL" clId="{87D7C839-E1DB-4984-9884-DAFCEE36B2C9}" dt="2024-09-15T20:21:17.469" v="8276" actId="20577"/>
+        <pc:chgData name="Gsell, Steven D." userId="6e84bc59-7e38-490f-9209-f43946aa50d2" providerId="ADAL" clId="{87D7C839-E1DB-4984-9884-DAFCEE36B2C9}" dt="2024-09-16T22:56:18.152" v="8555" actId="20577"/>
         <pc:sldMkLst>
           <pc:docMk/>
           <pc:sldMk cId="2469890694" sldId="274"/>
@@ -1133,7 +1134,7 @@
           </ac:spMkLst>
         </pc:spChg>
         <pc:spChg chg="mod">
-          <ac:chgData name="Gsell, Steven D." userId="6e84bc59-7e38-490f-9209-f43946aa50d2" providerId="ADAL" clId="{87D7C839-E1DB-4984-9884-DAFCEE36B2C9}" dt="2024-09-15T20:21:17.469" v="8276" actId="20577"/>
+          <ac:chgData name="Gsell, Steven D." userId="6e84bc59-7e38-490f-9209-f43946aa50d2" providerId="ADAL" clId="{87D7C839-E1DB-4984-9884-DAFCEE36B2C9}" dt="2024-09-16T22:56:18.152" v="8555" actId="20577"/>
           <ac:spMkLst>
             <pc:docMk/>
             <pc:sldMk cId="2469890694" sldId="274"/>
@@ -1272,6 +1273,37 @@
             <pc:docMk/>
             <pc:sldMk cId="2876943490" sldId="276"/>
             <ac:picMk id="10" creationId="{1999192E-5F5F-4BB7-D567-F4A3CEEFE9C6}"/>
+          </ac:picMkLst>
+        </pc:picChg>
+      </pc:sldChg>
+      <pc:sldChg chg="addSp modSp add mod">
+        <pc:chgData name="Gsell, Steven D." userId="6e84bc59-7e38-490f-9209-f43946aa50d2" providerId="ADAL" clId="{87D7C839-E1DB-4984-9884-DAFCEE36B2C9}" dt="2024-09-16T23:02:23.054" v="9057" actId="1076"/>
+        <pc:sldMkLst>
+          <pc:docMk/>
+          <pc:sldMk cId="3388506856" sldId="277"/>
+        </pc:sldMkLst>
+        <pc:spChg chg="mod">
+          <ac:chgData name="Gsell, Steven D." userId="6e84bc59-7e38-490f-9209-f43946aa50d2" providerId="ADAL" clId="{87D7C839-E1DB-4984-9884-DAFCEE36B2C9}" dt="2024-09-16T22:57:12.767" v="8613" actId="20577"/>
+          <ac:spMkLst>
+            <pc:docMk/>
+            <pc:sldMk cId="3388506856" sldId="277"/>
+            <ac:spMk id="7" creationId="{884E008F-D37C-05E3-B464-8FE7CAD33DC1}"/>
+          </ac:spMkLst>
+        </pc:spChg>
+        <pc:spChg chg="mod">
+          <ac:chgData name="Gsell, Steven D." userId="6e84bc59-7e38-490f-9209-f43946aa50d2" providerId="ADAL" clId="{87D7C839-E1DB-4984-9884-DAFCEE36B2C9}" dt="2024-09-16T23:01:30.076" v="9054" actId="20577"/>
+          <ac:spMkLst>
+            <pc:docMk/>
+            <pc:sldMk cId="3388506856" sldId="277"/>
+            <ac:spMk id="8" creationId="{3864AF18-5C68-562E-2B23-B2944DA8E681}"/>
+          </ac:spMkLst>
+        </pc:spChg>
+        <pc:picChg chg="add mod">
+          <ac:chgData name="Gsell, Steven D." userId="6e84bc59-7e38-490f-9209-f43946aa50d2" providerId="ADAL" clId="{87D7C839-E1DB-4984-9884-DAFCEE36B2C9}" dt="2024-09-16T23:02:23.054" v="9057" actId="1076"/>
+          <ac:picMkLst>
+            <pc:docMk/>
+            <pc:sldMk cId="3388506856" sldId="277"/>
+            <ac:picMk id="5" creationId="{C1A39759-8FCD-7F9C-5B70-91B3AABF2F0A}"/>
           </ac:picMkLst>
         </pc:picChg>
       </pc:sldChg>
@@ -1701,7 +1733,7 @@
           <a:p>
             <a:fld id="{53BEF823-48A5-43FC-BE03-E79964288B41}" type="datetimeFigureOut">
               <a:rPr lang="en-US" smtClean="0"/>
-              <a:t>9/15/2024</a:t>
+              <a:t>9/16/2024</a:t>
             </a:fld>
             <a:endParaRPr lang="en-US" dirty="0"/>
           </a:p>
@@ -1912,7 +1944,7 @@
             <a:fld id="{53BEF823-48A5-43FC-BE03-E79964288B41}" type="datetimeFigureOut">
               <a:rPr lang="en-US" smtClean="0"/>
               <a:pPr algn="r"/>
-              <a:t>9/15/2024</a:t>
+              <a:t>9/16/2024</a:t>
             </a:fld>
             <a:endParaRPr lang="en-US" dirty="0"/>
           </a:p>
@@ -2127,7 +2159,7 @@
             <a:fld id="{53BEF823-48A5-43FC-BE03-E79964288B41}" type="datetimeFigureOut">
               <a:rPr lang="en-US" smtClean="0"/>
               <a:pPr algn="r"/>
-              <a:t>9/15/2024</a:t>
+              <a:t>9/16/2024</a:t>
             </a:fld>
             <a:endParaRPr lang="en-US" dirty="0"/>
           </a:p>
@@ -2330,7 +2362,7 @@
             <a:fld id="{53BEF823-48A5-43FC-BE03-E79964288B41}" type="datetimeFigureOut">
               <a:rPr lang="en-US" smtClean="0"/>
               <a:pPr algn="r"/>
-              <a:t>9/15/2024</a:t>
+              <a:t>9/16/2024</a:t>
             </a:fld>
             <a:endParaRPr lang="en-US" dirty="0"/>
           </a:p>
@@ -2614,7 +2646,7 @@
             <a:fld id="{53BEF823-48A5-43FC-BE03-E79964288B41}" type="datetimeFigureOut">
               <a:rPr lang="en-US" smtClean="0"/>
               <a:pPr algn="r"/>
-              <a:t>9/15/2024</a:t>
+              <a:t>9/16/2024</a:t>
             </a:fld>
             <a:endParaRPr lang="en-US" dirty="0"/>
           </a:p>
@@ -2858,7 +2890,7 @@
             <a:fld id="{53BEF823-48A5-43FC-BE03-E79964288B41}" type="datetimeFigureOut">
               <a:rPr lang="en-US" smtClean="0"/>
               <a:pPr algn="r"/>
-              <a:t>9/15/2024</a:t>
+              <a:t>9/16/2024</a:t>
             </a:fld>
             <a:endParaRPr lang="en-US" dirty="0"/>
           </a:p>
@@ -3301,7 +3333,7 @@
             <a:fld id="{53BEF823-48A5-43FC-BE03-E79964288B41}" type="datetimeFigureOut">
               <a:rPr lang="en-US" smtClean="0"/>
               <a:pPr algn="r"/>
-              <a:t>9/15/2024</a:t>
+              <a:t>9/16/2024</a:t>
             </a:fld>
             <a:endParaRPr lang="en-US" dirty="0"/>
           </a:p>
@@ -3447,7 +3479,7 @@
             <a:fld id="{53BEF823-48A5-43FC-BE03-E79964288B41}" type="datetimeFigureOut">
               <a:rPr lang="en-US" smtClean="0"/>
               <a:pPr algn="r"/>
-              <a:t>9/15/2024</a:t>
+              <a:t>9/16/2024</a:t>
             </a:fld>
             <a:endParaRPr lang="en-US" dirty="0"/>
           </a:p>
@@ -3565,7 +3597,7 @@
             <a:fld id="{53BEF823-48A5-43FC-BE03-E79964288B41}" type="datetimeFigureOut">
               <a:rPr lang="en-US" smtClean="0"/>
               <a:pPr algn="r"/>
-              <a:t>9/15/2024</a:t>
+              <a:t>9/16/2024</a:t>
             </a:fld>
             <a:endParaRPr lang="en-US" dirty="0"/>
           </a:p>
@@ -3849,7 +3881,7 @@
             <a:fld id="{53BEF823-48A5-43FC-BE03-E79964288B41}" type="datetimeFigureOut">
               <a:rPr lang="en-US" smtClean="0"/>
               <a:pPr algn="r"/>
-              <a:t>9/15/2024</a:t>
+              <a:t>9/16/2024</a:t>
             </a:fld>
             <a:endParaRPr lang="en-US" dirty="0"/>
           </a:p>
@@ -4144,7 +4176,7 @@
             <a:fld id="{53BEF823-48A5-43FC-BE03-E79964288B41}" type="datetimeFigureOut">
               <a:rPr lang="en-US" smtClean="0"/>
               <a:pPr algn="r"/>
-              <a:t>9/15/2024</a:t>
+              <a:t>9/16/2024</a:t>
             </a:fld>
             <a:endParaRPr lang="en-US" dirty="0"/>
           </a:p>
@@ -4639,7 +4671,7 @@
             <a:fld id="{53BEF823-48A5-43FC-BE03-E79964288B41}" type="datetimeFigureOut">
               <a:rPr lang="en-US" smtClean="0"/>
               <a:pPr algn="r"/>
-              <a:t>9/15/2024</a:t>
+              <a:t>9/16/2024</a:t>
             </a:fld>
             <a:endParaRPr lang="en-US" dirty="0"/>
           </a:p>
@@ -6963,7 +6995,7 @@
             </a:pPr>
             <a:r>
               <a:rPr lang="en-US" b="1" dirty="0"/>
-              <a:t>git add *</a:t>
+              <a:t>git add index.html</a:t>
             </a:r>
           </a:p>
           <a:p>
@@ -8596,6 +8628,402 @@
     <p:extLst>
       <p:ext uri="{BB962C8B-B14F-4D97-AF65-F5344CB8AC3E}">
         <p14:creationId xmlns:p14="http://schemas.microsoft.com/office/powerpoint/2010/main" val="2876943490"/>
+      </p:ext>
+    </p:extLst>
+  </p:cSld>
+  <p:clrMapOvr>
+    <a:masterClrMapping/>
+  </p:clrMapOvr>
+</p:sld>
+</file>
+
+<file path=ppt/slides/slide17.xml><?xml version="1.0" encoding="utf-8"?>
+<p:sld xmlns:a="http://schemas.openxmlformats.org/drawingml/2006/main" xmlns:r="http://schemas.openxmlformats.org/officeDocument/2006/relationships" xmlns:p="http://schemas.openxmlformats.org/presentationml/2006/main">
+  <p:cSld>
+    <p:spTree>
+      <p:nvGrpSpPr>
+        <p:cNvPr id="1" name=""/>
+        <p:cNvGrpSpPr/>
+        <p:nvPr/>
+      </p:nvGrpSpPr>
+      <p:grpSpPr>
+        <a:xfrm>
+          <a:off x="0" y="0"/>
+          <a:ext cx="0" cy="0"/>
+          <a:chOff x="0" y="0"/>
+          <a:chExt cx="0" cy="0"/>
+        </a:xfrm>
+      </p:grpSpPr>
+      <p:sp>
+        <p:nvSpPr>
+          <p:cNvPr id="4" name="Rectangle 3">
+            <a:extLst>
+              <a:ext uri="{FF2B5EF4-FFF2-40B4-BE49-F238E27FC236}">
+                <a16:creationId xmlns:a16="http://schemas.microsoft.com/office/drawing/2014/main" id="{DB4281AA-335B-3B26-6953-A1FD6E956CB2}"/>
+              </a:ext>
+            </a:extLst>
+          </p:cNvPr>
+          <p:cNvSpPr>
+            <a:spLocks noGrp="1" noRot="1" noMove="1" noResize="1" noEditPoints="1" noAdjustHandles="1" noChangeArrowheads="1" noChangeShapeType="1"/>
+          </p:cNvSpPr>
+          <p:nvPr/>
+        </p:nvSpPr>
+        <p:spPr>
+          <a:xfrm>
+            <a:off x="0" y="0"/>
+            <a:ext cx="12192000" cy="6858000"/>
+          </a:xfrm>
+          <a:prstGeom prst="rect">
+            <a:avLst/>
+          </a:prstGeom>
+          <a:solidFill>
+            <a:schemeClr val="bg2"/>
+          </a:solidFill>
+        </p:spPr>
+        <p:style>
+          <a:lnRef idx="2">
+            <a:schemeClr val="accent1">
+              <a:shade val="15000"/>
+            </a:schemeClr>
+          </a:lnRef>
+          <a:fillRef idx="1">
+            <a:schemeClr val="accent1"/>
+          </a:fillRef>
+          <a:effectRef idx="0">
+            <a:schemeClr val="accent1"/>
+          </a:effectRef>
+          <a:fontRef idx="minor">
+            <a:schemeClr val="lt1"/>
+          </a:fontRef>
+        </p:style>
+        <p:txBody>
+          <a:bodyPr rtlCol="0" anchor="ctr"/>
+          <a:lstStyle/>
+          <a:p>
+            <a:pPr algn="ctr"/>
+            <a:endParaRPr lang="en-US"/>
+          </a:p>
+        </p:txBody>
+      </p:sp>
+      <p:sp>
+        <p:nvSpPr>
+          <p:cNvPr id="2" name="Rectangle 1">
+            <a:extLst>
+              <a:ext uri="{FF2B5EF4-FFF2-40B4-BE49-F238E27FC236}">
+                <a16:creationId xmlns:a16="http://schemas.microsoft.com/office/drawing/2014/main" id="{829FF999-D711-DA7F-C720-162D38E0EEBD}"/>
+              </a:ext>
+            </a:extLst>
+          </p:cNvPr>
+          <p:cNvSpPr/>
+          <p:nvPr/>
+        </p:nvSpPr>
+        <p:spPr>
+          <a:xfrm>
+            <a:off x="0" y="0"/>
+            <a:ext cx="12192000" cy="1504335"/>
+          </a:xfrm>
+          <a:prstGeom prst="rect">
+            <a:avLst/>
+          </a:prstGeom>
+          <a:solidFill>
+            <a:srgbClr val="20495E"/>
+          </a:solidFill>
+        </p:spPr>
+        <p:style>
+          <a:lnRef idx="2">
+            <a:schemeClr val="accent1">
+              <a:shade val="15000"/>
+            </a:schemeClr>
+          </a:lnRef>
+          <a:fillRef idx="1">
+            <a:schemeClr val="accent1"/>
+          </a:fillRef>
+          <a:effectRef idx="0">
+            <a:schemeClr val="accent1"/>
+          </a:effectRef>
+          <a:fontRef idx="minor">
+            <a:schemeClr val="lt1"/>
+          </a:fontRef>
+        </p:style>
+        <p:txBody>
+          <a:bodyPr rtlCol="0" anchor="ctr"/>
+          <a:lstStyle/>
+          <a:p>
+            <a:pPr algn="ctr"/>
+            <a:endParaRPr lang="en-US"/>
+          </a:p>
+        </p:txBody>
+      </p:sp>
+      <p:sp>
+        <p:nvSpPr>
+          <p:cNvPr id="7" name="Title 1">
+            <a:extLst>
+              <a:ext uri="{FF2B5EF4-FFF2-40B4-BE49-F238E27FC236}">
+                <a16:creationId xmlns:a16="http://schemas.microsoft.com/office/drawing/2014/main" id="{884E008F-D37C-05E3-B464-8FE7CAD33DC1}"/>
+              </a:ext>
+            </a:extLst>
+          </p:cNvPr>
+          <p:cNvSpPr txBox="1">
+            <a:spLocks/>
+          </p:cNvSpPr>
+          <p:nvPr/>
+        </p:nvSpPr>
+        <p:spPr>
+          <a:xfrm>
+            <a:off x="1569720" y="281448"/>
+            <a:ext cx="9052560" cy="941438"/>
+          </a:xfrm>
+          <a:prstGeom prst="rect">
+            <a:avLst/>
+          </a:prstGeom>
+        </p:spPr>
+        <p:txBody>
+          <a:bodyPr>
+            <a:normAutofit/>
+          </a:bodyPr>
+          <a:lstStyle>
+            <a:lvl1pPr algn="l" defTabSz="914400" rtl="0" eaLnBrk="1" latinLnBrk="0" hangingPunct="1">
+              <a:lnSpc>
+                <a:spcPct val="90000"/>
+              </a:lnSpc>
+              <a:spcBef>
+                <a:spcPct val="0"/>
+              </a:spcBef>
+              <a:buNone/>
+              <a:defRPr sz="6000" i="1" kern="1200" spc="100" baseline="0">
+                <a:solidFill>
+                  <a:schemeClr val="tx1">
+                    <a:lumMod val="85000"/>
+                    <a:lumOff val="15000"/>
+                  </a:schemeClr>
+                </a:solidFill>
+                <a:latin typeface="+mj-lt"/>
+                <a:ea typeface="+mj-ea"/>
+                <a:cs typeface="+mj-cs"/>
+              </a:defRPr>
+            </a:lvl1pPr>
+          </a:lstStyle>
+          <a:p>
+            <a:pPr algn="ctr"/>
+            <a:r>
+              <a:rPr lang="en-US" dirty="0">
+                <a:solidFill>
+                  <a:schemeClr val="bg1"/>
+                </a:solidFill>
+              </a:rPr>
+              <a:t>Extra customization</a:t>
+            </a:r>
+            <a:endParaRPr lang="en-US" sz="2000" dirty="0">
+              <a:solidFill>
+                <a:schemeClr val="bg1"/>
+              </a:solidFill>
+            </a:endParaRPr>
+          </a:p>
+        </p:txBody>
+      </p:sp>
+      <p:sp>
+        <p:nvSpPr>
+          <p:cNvPr id="8" name="TextBox 7">
+            <a:extLst>
+              <a:ext uri="{FF2B5EF4-FFF2-40B4-BE49-F238E27FC236}">
+                <a16:creationId xmlns:a16="http://schemas.microsoft.com/office/drawing/2014/main" id="{3864AF18-5C68-562E-2B23-B2944DA8E681}"/>
+              </a:ext>
+            </a:extLst>
+          </p:cNvPr>
+          <p:cNvSpPr txBox="1"/>
+          <p:nvPr/>
+        </p:nvSpPr>
+        <p:spPr>
+          <a:xfrm>
+            <a:off x="1846744" y="1756042"/>
+            <a:ext cx="8498512" cy="3785075"/>
+          </a:xfrm>
+          <a:prstGeom prst="rect">
+            <a:avLst/>
+          </a:prstGeom>
+          <a:noFill/>
+        </p:spPr>
+        <p:txBody>
+          <a:bodyPr wrap="square" rtlCol="0">
+            <a:spAutoFit/>
+          </a:bodyPr>
+          <a:lstStyle/>
+          <a:p>
+            <a:pPr marL="285750" indent="-285750">
+              <a:lnSpc>
+                <a:spcPct val="150000"/>
+              </a:lnSpc>
+              <a:buFont typeface="Arial" panose="020B0604020202020204" pitchFamily="34" charset="0"/>
+              <a:buChar char="•"/>
+            </a:pPr>
+            <a:r>
+              <a:rPr lang="en-US" dirty="0"/>
+              <a:t>Follow the </a:t>
+            </a:r>
+            <a:r>
+              <a:rPr lang="en-US" dirty="0" err="1"/>
+              <a:t>Pexels</a:t>
+            </a:r>
+            <a:r>
+              <a:rPr lang="en-US" dirty="0"/>
+              <a:t> link on your website</a:t>
+            </a:r>
+          </a:p>
+          <a:p>
+            <a:pPr marL="285750" indent="-285750">
+              <a:lnSpc>
+                <a:spcPct val="150000"/>
+              </a:lnSpc>
+              <a:buFont typeface="Arial" panose="020B0604020202020204" pitchFamily="34" charset="0"/>
+              <a:buChar char="•"/>
+            </a:pPr>
+            <a:r>
+              <a:rPr lang="en-US" dirty="0"/>
+              <a:t>Download an image that represents you well</a:t>
+            </a:r>
+          </a:p>
+          <a:p>
+            <a:pPr marL="285750" indent="-285750">
+              <a:lnSpc>
+                <a:spcPct val="150000"/>
+              </a:lnSpc>
+              <a:buFont typeface="Arial" panose="020B0604020202020204" pitchFamily="34" charset="0"/>
+              <a:buChar char="•"/>
+            </a:pPr>
+            <a:r>
+              <a:rPr lang="en-US" dirty="0"/>
+              <a:t>Rename the file to “background.jpg”</a:t>
+            </a:r>
+          </a:p>
+          <a:p>
+            <a:pPr marL="285750" indent="-285750">
+              <a:lnSpc>
+                <a:spcPct val="150000"/>
+              </a:lnSpc>
+              <a:buFont typeface="Arial" panose="020B0604020202020204" pitchFamily="34" charset="0"/>
+              <a:buChar char="•"/>
+            </a:pPr>
+            <a:r>
+              <a:rPr lang="en-US" dirty="0"/>
+              <a:t>Place it into the images folder in your website files</a:t>
+            </a:r>
+          </a:p>
+          <a:p>
+            <a:pPr marL="742950" lvl="1" indent="-285750">
+              <a:lnSpc>
+                <a:spcPct val="150000"/>
+              </a:lnSpc>
+              <a:buFont typeface="Courier New" panose="02070309020205020404" pitchFamily="49" charset="0"/>
+              <a:buChar char="o"/>
+            </a:pPr>
+            <a:r>
+              <a:rPr lang="en-US" dirty="0"/>
+              <a:t>Select to replace the existing file</a:t>
+            </a:r>
+          </a:p>
+          <a:p>
+            <a:pPr marL="285750" indent="-285750">
+              <a:lnSpc>
+                <a:spcPct val="150000"/>
+              </a:lnSpc>
+              <a:buFont typeface="Arial" panose="020B0604020202020204" pitchFamily="34" charset="0"/>
+              <a:buChar char="•"/>
+            </a:pPr>
+            <a:r>
+              <a:rPr lang="en-US" dirty="0"/>
+              <a:t>In the </a:t>
+            </a:r>
+            <a:r>
+              <a:rPr lang="en-US" dirty="0" err="1"/>
+              <a:t>VSCode</a:t>
+            </a:r>
+            <a:r>
+              <a:rPr lang="en-US" dirty="0"/>
+              <a:t> Terminal</a:t>
+            </a:r>
+          </a:p>
+          <a:p>
+            <a:pPr marL="742950" lvl="1" indent="-285750">
+              <a:lnSpc>
+                <a:spcPct val="150000"/>
+              </a:lnSpc>
+              <a:buFont typeface="Courier New" panose="02070309020205020404" pitchFamily="49" charset="0"/>
+              <a:buChar char="o"/>
+            </a:pPr>
+            <a:r>
+              <a:rPr lang="en-US" b="1" dirty="0"/>
+              <a:t>git add images</a:t>
+            </a:r>
+          </a:p>
+          <a:p>
+            <a:pPr marL="742950" lvl="1" indent="-285750">
+              <a:lnSpc>
+                <a:spcPct val="150000"/>
+              </a:lnSpc>
+              <a:buFont typeface="Courier New" panose="02070309020205020404" pitchFamily="49" charset="0"/>
+              <a:buChar char="o"/>
+            </a:pPr>
+            <a:r>
+              <a:rPr lang="en-US" b="1" dirty="0"/>
+              <a:t>git commit –m “Updated my background image”</a:t>
+            </a:r>
+          </a:p>
+          <a:p>
+            <a:pPr marL="742950" lvl="1" indent="-285750">
+              <a:lnSpc>
+                <a:spcPct val="150000"/>
+              </a:lnSpc>
+              <a:buFont typeface="Courier New" panose="02070309020205020404" pitchFamily="49" charset="0"/>
+              <a:buChar char="o"/>
+            </a:pPr>
+            <a:r>
+              <a:rPr lang="en-US" b="1" dirty="0"/>
+              <a:t>git push origin main</a:t>
+            </a:r>
+            <a:endParaRPr lang="en-US" dirty="0"/>
+          </a:p>
+        </p:txBody>
+      </p:sp>
+      <p:pic>
+        <p:nvPicPr>
+          <p:cNvPr id="5" name="Graphic 4">
+            <a:extLst>
+              <a:ext uri="{FF2B5EF4-FFF2-40B4-BE49-F238E27FC236}">
+                <a16:creationId xmlns:a16="http://schemas.microsoft.com/office/drawing/2014/main" id="{C1A39759-8FCD-7F9C-5B70-91B3AABF2F0A}"/>
+              </a:ext>
+            </a:extLst>
+          </p:cNvPr>
+          <p:cNvPicPr>
+            <a:picLocks noChangeAspect="1"/>
+          </p:cNvPicPr>
+          <p:nvPr/>
+        </p:nvPicPr>
+        <p:blipFill>
+          <a:blip r:embed="rId2">
+            <a:extLst>
+              <a:ext uri="{96DAC541-7B7A-43D3-8B79-37D633B846F1}">
+                <asvg:svgBlip xmlns:asvg="http://schemas.microsoft.com/office/drawing/2016/SVG/main" r:embed="rId3"/>
+              </a:ext>
+            </a:extLst>
+          </a:blip>
+          <a:stretch>
+            <a:fillRect/>
+          </a:stretch>
+        </p:blipFill>
+        <p:spPr>
+          <a:xfrm>
+            <a:off x="10345256" y="1504334"/>
+            <a:ext cx="1728019" cy="1728019"/>
+          </a:xfrm>
+          <a:prstGeom prst="rect">
+            <a:avLst/>
+          </a:prstGeom>
+        </p:spPr>
+      </p:pic>
+    </p:spTree>
+    <p:extLst>
+      <p:ext uri="{BB962C8B-B14F-4D97-AF65-F5344CB8AC3E}">
+        <p14:creationId xmlns:p14="http://schemas.microsoft.com/office/powerpoint/2010/main" val="3388506856"/>
       </p:ext>
     </p:extLst>
   </p:cSld>

</xml_diff>